<commit_message>
#4 slides for defense slightly fixed
</commit_message>
<xml_diff>
--- a/root/docs/slides/Rigin_Anton_Term_Project_Defense.pptx
+++ b/root/docs/slides/Rigin_Anton_Term_Project_Defense.pptx
@@ -2176,7 +2176,7 @@
           </a:ln>
           <a:extLst>
             <a:ext uri="{C572A759-6A51-4108-AA02-DFA0A04FC94B}">
-              <ma14:wrappingTextBoxFlag xmlns="" xmlns:m="http://schemas.openxmlformats.org/officeDocument/2006/math" xmlns:a14="http://schemas.microsoft.com/office/drawing/2010/main" xmlns:ma14="http://schemas.microsoft.com/office/mac/drawingml/2011/main" val="1"/>
+              <ma14:wrappingTextBoxFlag xmlns:ma14="http://schemas.microsoft.com/office/mac/drawingml/2011/main" xmlns:a14="http://schemas.microsoft.com/office/drawing/2010/main" xmlns:m="http://schemas.openxmlformats.org/officeDocument/2006/math" xmlns="" val="1"/>
             </a:ext>
           </a:extLst>
         </p:spPr>
@@ -2215,7 +2215,7 @@
           </a:ln>
           <a:extLst>
             <a:ext uri="{C572A759-6A51-4108-AA02-DFA0A04FC94B}">
-              <ma14:wrappingTextBoxFlag xmlns="" xmlns:m="http://schemas.openxmlformats.org/officeDocument/2006/math" xmlns:a14="http://schemas.microsoft.com/office/drawing/2010/main" xmlns:ma14="http://schemas.microsoft.com/office/mac/drawingml/2011/main" val="1"/>
+              <ma14:wrappingTextBoxFlag xmlns:ma14="http://schemas.microsoft.com/office/mac/drawingml/2011/main" xmlns:a14="http://schemas.microsoft.com/office/drawing/2010/main" xmlns:m="http://schemas.openxmlformats.org/officeDocument/2006/math" xmlns="" val="1"/>
             </a:ext>
           </a:extLst>
         </p:spPr>
@@ -3175,7 +3175,7 @@
           </a:ln>
           <a:extLst>
             <a:ext uri="{C572A759-6A51-4108-AA02-DFA0A04FC94B}">
-              <ma14:wrappingTextBoxFlag xmlns="" xmlns:m="http://schemas.openxmlformats.org/officeDocument/2006/math" xmlns:a14="http://schemas.microsoft.com/office/drawing/2010/main" xmlns:ma14="http://schemas.microsoft.com/office/mac/drawingml/2011/main" val="1"/>
+              <ma14:wrappingTextBoxFlag xmlns:ma14="http://schemas.microsoft.com/office/mac/drawingml/2011/main" xmlns:a14="http://schemas.microsoft.com/office/drawing/2010/main" xmlns:m="http://schemas.openxmlformats.org/officeDocument/2006/math" xmlns="" val="1"/>
             </a:ext>
           </a:extLst>
         </p:spPr>
@@ -3220,7 +3220,7 @@
           </a:ln>
           <a:extLst>
             <a:ext uri="{C572A759-6A51-4108-AA02-DFA0A04FC94B}">
-              <ma14:wrappingTextBoxFlag xmlns="" xmlns:m="http://schemas.openxmlformats.org/officeDocument/2006/math" xmlns:a14="http://schemas.microsoft.com/office/drawing/2010/main" xmlns:ma14="http://schemas.microsoft.com/office/mac/drawingml/2011/main" val="1"/>
+              <ma14:wrappingTextBoxFlag xmlns:ma14="http://schemas.microsoft.com/office/mac/drawingml/2011/main" xmlns:a14="http://schemas.microsoft.com/office/drawing/2010/main" xmlns:m="http://schemas.openxmlformats.org/officeDocument/2006/math" xmlns="" val="1"/>
             </a:ext>
           </a:extLst>
         </p:spPr>
@@ -3315,7 +3315,7 @@
           </a:ln>
           <a:extLst>
             <a:ext uri="{C572A759-6A51-4108-AA02-DFA0A04FC94B}">
-              <ma14:wrappingTextBoxFlag xmlns="" xmlns:m="http://schemas.openxmlformats.org/officeDocument/2006/math" xmlns:a14="http://schemas.microsoft.com/office/drawing/2010/main" xmlns:ma14="http://schemas.microsoft.com/office/mac/drawingml/2011/main" val="1"/>
+              <ma14:wrappingTextBoxFlag xmlns:ma14="http://schemas.microsoft.com/office/mac/drawingml/2011/main" xmlns:a14="http://schemas.microsoft.com/office/drawing/2010/main" xmlns:m="http://schemas.openxmlformats.org/officeDocument/2006/math" xmlns="" val="1"/>
             </a:ext>
           </a:extLst>
         </p:spPr>
@@ -3396,7 +3396,7 @@
           </a:ln>
           <a:extLst>
             <a:ext uri="{C572A759-6A51-4108-AA02-DFA0A04FC94B}">
-              <ma14:wrappingTextBoxFlag xmlns="" xmlns:m="http://schemas.openxmlformats.org/officeDocument/2006/math" xmlns:a14="http://schemas.microsoft.com/office/drawing/2010/main" xmlns:ma14="http://schemas.microsoft.com/office/mac/drawingml/2011/main" val="1"/>
+              <ma14:wrappingTextBoxFlag xmlns:ma14="http://schemas.microsoft.com/office/mac/drawingml/2011/main" xmlns:a14="http://schemas.microsoft.com/office/drawing/2010/main" xmlns:m="http://schemas.openxmlformats.org/officeDocument/2006/math" xmlns="" val="1"/>
             </a:ext>
           </a:extLst>
         </p:spPr>
@@ -3613,7 +3613,7 @@
           </a:ln>
           <a:extLst>
             <a:ext uri="{C572A759-6A51-4108-AA02-DFA0A04FC94B}">
-              <ma14:wrappingTextBoxFlag xmlns="" xmlns:m="http://schemas.openxmlformats.org/officeDocument/2006/math" xmlns:a14="http://schemas.microsoft.com/office/drawing/2010/main" xmlns:ma14="http://schemas.microsoft.com/office/mac/drawingml/2011/main" val="1"/>
+              <ma14:wrappingTextBoxFlag xmlns:ma14="http://schemas.microsoft.com/office/mac/drawingml/2011/main" xmlns:a14="http://schemas.microsoft.com/office/drawing/2010/main" xmlns:m="http://schemas.openxmlformats.org/officeDocument/2006/math" xmlns="" val="1"/>
             </a:ext>
           </a:extLst>
         </p:spPr>
@@ -3671,7 +3671,7 @@
           </a:ln>
           <a:extLst>
             <a:ext uri="{C572A759-6A51-4108-AA02-DFA0A04FC94B}">
-              <ma14:wrappingTextBoxFlag xmlns="" xmlns:m="http://schemas.openxmlformats.org/officeDocument/2006/math" xmlns:a14="http://schemas.microsoft.com/office/drawing/2010/main" xmlns:ma14="http://schemas.microsoft.com/office/mac/drawingml/2011/main" val="1"/>
+              <ma14:wrappingTextBoxFlag xmlns:ma14="http://schemas.microsoft.com/office/mac/drawingml/2011/main" xmlns:a14="http://schemas.microsoft.com/office/drawing/2010/main" xmlns:m="http://schemas.openxmlformats.org/officeDocument/2006/math" xmlns="" val="1"/>
             </a:ext>
           </a:extLst>
         </p:spPr>
@@ -3934,7 +3934,7 @@
           </a:ln>
           <a:extLst>
             <a:ext uri="{C572A759-6A51-4108-AA02-DFA0A04FC94B}">
-              <ma14:wrappingTextBoxFlag xmlns="" xmlns:m="http://schemas.openxmlformats.org/officeDocument/2006/math" xmlns:a14="http://schemas.microsoft.com/office/drawing/2010/main" xmlns:ma14="http://schemas.microsoft.com/office/mac/drawingml/2011/main" val="1"/>
+              <ma14:wrappingTextBoxFlag xmlns:ma14="http://schemas.microsoft.com/office/mac/drawingml/2011/main" xmlns:a14="http://schemas.microsoft.com/office/drawing/2010/main" xmlns:m="http://schemas.openxmlformats.org/officeDocument/2006/math" xmlns="" val="1"/>
             </a:ext>
           </a:extLst>
         </p:spPr>
@@ -3992,7 +3992,7 @@
           </a:ln>
           <a:extLst>
             <a:ext uri="{C572A759-6A51-4108-AA02-DFA0A04FC94B}">
-              <ma14:wrappingTextBoxFlag xmlns="" xmlns:m="http://schemas.openxmlformats.org/officeDocument/2006/math" xmlns:a14="http://schemas.microsoft.com/office/drawing/2010/main" xmlns:ma14="http://schemas.microsoft.com/office/mac/drawingml/2011/main" val="1"/>
+              <ma14:wrappingTextBoxFlag xmlns:ma14="http://schemas.microsoft.com/office/mac/drawingml/2011/main" xmlns:a14="http://schemas.microsoft.com/office/drawing/2010/main" xmlns:m="http://schemas.openxmlformats.org/officeDocument/2006/math" xmlns="" val="1"/>
             </a:ext>
           </a:extLst>
         </p:spPr>
@@ -4255,7 +4255,7 @@
           </a:ln>
           <a:extLst>
             <a:ext uri="{C572A759-6A51-4108-AA02-DFA0A04FC94B}">
-              <ma14:wrappingTextBoxFlag xmlns="" xmlns:m="http://schemas.openxmlformats.org/officeDocument/2006/math" xmlns:a14="http://schemas.microsoft.com/office/drawing/2010/main" xmlns:ma14="http://schemas.microsoft.com/office/mac/drawingml/2011/main" val="1"/>
+              <ma14:wrappingTextBoxFlag xmlns:ma14="http://schemas.microsoft.com/office/mac/drawingml/2011/main" xmlns:a14="http://schemas.microsoft.com/office/drawing/2010/main" xmlns:m="http://schemas.openxmlformats.org/officeDocument/2006/math" xmlns="" val="1"/>
             </a:ext>
           </a:extLst>
         </p:spPr>
@@ -4312,7 +4312,7 @@
           </a:ln>
           <a:extLst>
             <a:ext uri="{C572A759-6A51-4108-AA02-DFA0A04FC94B}">
-              <ma14:wrappingTextBoxFlag xmlns="" xmlns:m="http://schemas.openxmlformats.org/officeDocument/2006/math" xmlns:a14="http://schemas.microsoft.com/office/drawing/2010/main" xmlns:ma14="http://schemas.microsoft.com/office/mac/drawingml/2011/main" val="1"/>
+              <ma14:wrappingTextBoxFlag xmlns:ma14="http://schemas.microsoft.com/office/mac/drawingml/2011/main" xmlns:a14="http://schemas.microsoft.com/office/drawing/2010/main" xmlns:m="http://schemas.openxmlformats.org/officeDocument/2006/math" xmlns="" val="1"/>
             </a:ext>
           </a:extLst>
         </p:spPr>
@@ -4404,7 +4404,7 @@
           </a:ln>
           <a:extLst>
             <a:ext uri="{C572A759-6A51-4108-AA02-DFA0A04FC94B}">
-              <ma14:wrappingTextBoxFlag xmlns="" xmlns:m="http://schemas.openxmlformats.org/officeDocument/2006/math" xmlns:a14="http://schemas.microsoft.com/office/drawing/2010/main" xmlns:ma14="http://schemas.microsoft.com/office/mac/drawingml/2011/main" val="1"/>
+              <ma14:wrappingTextBoxFlag xmlns:ma14="http://schemas.microsoft.com/office/mac/drawingml/2011/main" xmlns:a14="http://schemas.microsoft.com/office/drawing/2010/main" xmlns:m="http://schemas.openxmlformats.org/officeDocument/2006/math" xmlns="" val="1"/>
             </a:ext>
           </a:extLst>
         </p:spPr>
@@ -4819,7 +4819,7 @@
           </a:ln>
           <a:extLst>
             <a:ext uri="{C572A759-6A51-4108-AA02-DFA0A04FC94B}">
-              <ma14:wrappingTextBoxFlag xmlns="" xmlns:m="http://schemas.openxmlformats.org/officeDocument/2006/math" xmlns:a14="http://schemas.microsoft.com/office/drawing/2010/main" xmlns:ma14="http://schemas.microsoft.com/office/mac/drawingml/2011/main" val="1"/>
+              <ma14:wrappingTextBoxFlag xmlns:ma14="http://schemas.microsoft.com/office/mac/drawingml/2011/main" xmlns:a14="http://schemas.microsoft.com/office/drawing/2010/main" xmlns:m="http://schemas.openxmlformats.org/officeDocument/2006/math" xmlns="" val="1"/>
             </a:ext>
           </a:extLst>
         </p:spPr>
@@ -4876,7 +4876,7 @@
           </a:ln>
           <a:extLst>
             <a:ext uri="{C572A759-6A51-4108-AA02-DFA0A04FC94B}">
-              <ma14:wrappingTextBoxFlag xmlns="" xmlns:m="http://schemas.openxmlformats.org/officeDocument/2006/math" xmlns:a14="http://schemas.microsoft.com/office/drawing/2010/main" xmlns:ma14="http://schemas.microsoft.com/office/mac/drawingml/2011/main" val="1"/>
+              <ma14:wrappingTextBoxFlag xmlns:ma14="http://schemas.microsoft.com/office/mac/drawingml/2011/main" xmlns:a14="http://schemas.microsoft.com/office/drawing/2010/main" xmlns:m="http://schemas.openxmlformats.org/officeDocument/2006/math" xmlns="" val="1"/>
             </a:ext>
           </a:extLst>
         </p:spPr>
@@ -4968,7 +4968,7 @@
           </a:ln>
           <a:extLst>
             <a:ext uri="{C572A759-6A51-4108-AA02-DFA0A04FC94B}">
-              <ma14:wrappingTextBoxFlag xmlns="" xmlns:m="http://schemas.openxmlformats.org/officeDocument/2006/math" xmlns:a14="http://schemas.microsoft.com/office/drawing/2010/main" xmlns:ma14="http://schemas.microsoft.com/office/mac/drawingml/2011/main" val="1"/>
+              <ma14:wrappingTextBoxFlag xmlns:ma14="http://schemas.microsoft.com/office/mac/drawingml/2011/main" xmlns:a14="http://schemas.microsoft.com/office/drawing/2010/main" xmlns:m="http://schemas.openxmlformats.org/officeDocument/2006/math" xmlns="" val="1"/>
             </a:ext>
           </a:extLst>
         </p:spPr>
@@ -5131,7 +5131,29 @@
                 <a:ea typeface="+mn-ea"/>
                 <a:cs typeface="+mn-cs"/>
               </a:rPr>
-              <a:t>Formulating the formal functional and non-functional requirements for the software tool (the DB-nets Renew plugin)</a:t>
+              <a:t>Formulating the formal </a:t>
+            </a:r>
+            <a:r>
+              <a:rPr lang="en-US" sz="4800">
+                <a:solidFill>
+                  <a:srgbClr val="253957"/>
+                </a:solidFill>
+                <a:latin typeface="+mn-lt"/>
+                <a:ea typeface="+mn-ea"/>
+                <a:cs typeface="+mn-cs"/>
+              </a:rPr>
+              <a:t>functional requirements </a:t>
+            </a:r>
+            <a:r>
+              <a:rPr lang="en-US" sz="4800" dirty="0">
+                <a:solidFill>
+                  <a:srgbClr val="253957"/>
+                </a:solidFill>
+                <a:latin typeface="+mn-lt"/>
+                <a:ea typeface="+mn-ea"/>
+                <a:cs typeface="+mn-cs"/>
+              </a:rPr>
+              <a:t>for the software tool (the DB-nets Renew plugin)</a:t>
             </a:r>
           </a:p>
           <a:p>
@@ -5396,7 +5418,7 @@
           </a:ln>
           <a:extLst>
             <a:ext uri="{C572A759-6A51-4108-AA02-DFA0A04FC94B}">
-              <ma14:wrappingTextBoxFlag xmlns:ma14="http://schemas.microsoft.com/office/mac/drawingml/2011/main" xmlns:a14="http://schemas.microsoft.com/office/drawing/2010/main" xmlns:m="http://schemas.openxmlformats.org/officeDocument/2006/math" xmlns="" val="1"/>
+              <ma14:wrappingTextBoxFlag xmlns="" xmlns:m="http://schemas.openxmlformats.org/officeDocument/2006/math" xmlns:a14="http://schemas.microsoft.com/office/drawing/2010/main" xmlns:ma14="http://schemas.microsoft.com/office/mac/drawingml/2011/main" val="1"/>
             </a:ext>
           </a:extLst>
         </p:spPr>
@@ -5453,7 +5475,7 @@
           </a:ln>
           <a:extLst>
             <a:ext uri="{C572A759-6A51-4108-AA02-DFA0A04FC94B}">
-              <ma14:wrappingTextBoxFlag xmlns:ma14="http://schemas.microsoft.com/office/mac/drawingml/2011/main" xmlns:a14="http://schemas.microsoft.com/office/drawing/2010/main" xmlns:m="http://schemas.openxmlformats.org/officeDocument/2006/math" xmlns="" val="1"/>
+              <ma14:wrappingTextBoxFlag xmlns="" xmlns:m="http://schemas.openxmlformats.org/officeDocument/2006/math" xmlns:a14="http://schemas.microsoft.com/office/drawing/2010/main" xmlns:ma14="http://schemas.microsoft.com/office/mac/drawingml/2011/main" val="1"/>
             </a:ext>
           </a:extLst>
         </p:spPr>
@@ -5545,7 +5567,7 @@
           </a:ln>
           <a:extLst>
             <a:ext uri="{C572A759-6A51-4108-AA02-DFA0A04FC94B}">
-              <ma14:wrappingTextBoxFlag xmlns:ma14="http://schemas.microsoft.com/office/mac/drawingml/2011/main" xmlns:a14="http://schemas.microsoft.com/office/drawing/2010/main" xmlns:m="http://schemas.openxmlformats.org/officeDocument/2006/math" xmlns="" val="1"/>
+              <ma14:wrappingTextBoxFlag xmlns="" xmlns:m="http://schemas.openxmlformats.org/officeDocument/2006/math" xmlns:a14="http://schemas.microsoft.com/office/drawing/2010/main" xmlns:ma14="http://schemas.microsoft.com/office/mac/drawingml/2011/main" val="1"/>
             </a:ext>
           </a:extLst>
         </p:spPr>
@@ -5809,7 +5831,7 @@
           </a:ln>
           <a:extLst>
             <a:ext uri="{C572A759-6A51-4108-AA02-DFA0A04FC94B}">
-              <ma14:wrappingTextBoxFlag xmlns:ma14="http://schemas.microsoft.com/office/mac/drawingml/2011/main" xmlns:a14="http://schemas.microsoft.com/office/drawing/2010/main" xmlns:m="http://schemas.openxmlformats.org/officeDocument/2006/math" xmlns="" val="1"/>
+              <ma14:wrappingTextBoxFlag xmlns="" xmlns:m="http://schemas.openxmlformats.org/officeDocument/2006/math" xmlns:a14="http://schemas.microsoft.com/office/drawing/2010/main" xmlns:ma14="http://schemas.microsoft.com/office/mac/drawingml/2011/main" val="1"/>
             </a:ext>
           </a:extLst>
         </p:spPr>
@@ -5866,7 +5888,7 @@
           </a:ln>
           <a:extLst>
             <a:ext uri="{C572A759-6A51-4108-AA02-DFA0A04FC94B}">
-              <ma14:wrappingTextBoxFlag xmlns:ma14="http://schemas.microsoft.com/office/mac/drawingml/2011/main" xmlns:a14="http://schemas.microsoft.com/office/drawing/2010/main" xmlns:m="http://schemas.openxmlformats.org/officeDocument/2006/math" xmlns="" val="1"/>
+              <ma14:wrappingTextBoxFlag xmlns="" xmlns:m="http://schemas.openxmlformats.org/officeDocument/2006/math" xmlns:a14="http://schemas.microsoft.com/office/drawing/2010/main" xmlns:ma14="http://schemas.microsoft.com/office/mac/drawingml/2011/main" val="1"/>
             </a:ext>
           </a:extLst>
         </p:spPr>
@@ -5958,7 +5980,7 @@
           </a:ln>
           <a:extLst>
             <a:ext uri="{C572A759-6A51-4108-AA02-DFA0A04FC94B}">
-              <ma14:wrappingTextBoxFlag xmlns:ma14="http://schemas.microsoft.com/office/mac/drawingml/2011/main" xmlns:a14="http://schemas.microsoft.com/office/drawing/2010/main" xmlns:m="http://schemas.openxmlformats.org/officeDocument/2006/math" xmlns="" val="1"/>
+              <ma14:wrappingTextBoxFlag xmlns="" xmlns:m="http://schemas.openxmlformats.org/officeDocument/2006/math" xmlns:a14="http://schemas.microsoft.com/office/drawing/2010/main" xmlns:ma14="http://schemas.microsoft.com/office/mac/drawingml/2011/main" val="1"/>
             </a:ext>
           </a:extLst>
         </p:spPr>
@@ -6268,7 +6290,7 @@
           </a:ln>
           <a:extLst>
             <a:ext uri="{C572A759-6A51-4108-AA02-DFA0A04FC94B}">
-              <ma14:wrappingTextBoxFlag xmlns:ma14="http://schemas.microsoft.com/office/mac/drawingml/2011/main" xmlns:a14="http://schemas.microsoft.com/office/drawing/2010/main" xmlns:m="http://schemas.openxmlformats.org/officeDocument/2006/math" xmlns="" val="1"/>
+              <ma14:wrappingTextBoxFlag xmlns="" xmlns:m="http://schemas.openxmlformats.org/officeDocument/2006/math" xmlns:a14="http://schemas.microsoft.com/office/drawing/2010/main" xmlns:ma14="http://schemas.microsoft.com/office/mac/drawingml/2011/main" val="1"/>
             </a:ext>
           </a:extLst>
         </p:spPr>
@@ -6325,7 +6347,7 @@
           </a:ln>
           <a:extLst>
             <a:ext uri="{C572A759-6A51-4108-AA02-DFA0A04FC94B}">
-              <ma14:wrappingTextBoxFlag xmlns:ma14="http://schemas.microsoft.com/office/mac/drawingml/2011/main" xmlns:a14="http://schemas.microsoft.com/office/drawing/2010/main" xmlns:m="http://schemas.openxmlformats.org/officeDocument/2006/math" xmlns="" val="1"/>
+              <ma14:wrappingTextBoxFlag xmlns="" xmlns:m="http://schemas.openxmlformats.org/officeDocument/2006/math" xmlns:a14="http://schemas.microsoft.com/office/drawing/2010/main" xmlns:ma14="http://schemas.microsoft.com/office/mac/drawingml/2011/main" val="1"/>
             </a:ext>
           </a:extLst>
         </p:spPr>
@@ -6417,7 +6439,7 @@
           </a:ln>
           <a:extLst>
             <a:ext uri="{C572A759-6A51-4108-AA02-DFA0A04FC94B}">
-              <ma14:wrappingTextBoxFlag xmlns:ma14="http://schemas.microsoft.com/office/mac/drawingml/2011/main" xmlns:a14="http://schemas.microsoft.com/office/drawing/2010/main" xmlns:m="http://schemas.openxmlformats.org/officeDocument/2006/math" xmlns="" val="1"/>
+              <ma14:wrappingTextBoxFlag xmlns="" xmlns:m="http://schemas.openxmlformats.org/officeDocument/2006/math" xmlns:a14="http://schemas.microsoft.com/office/drawing/2010/main" xmlns:ma14="http://schemas.microsoft.com/office/mac/drawingml/2011/main" val="1"/>
             </a:ext>
           </a:extLst>
         </p:spPr>
@@ -7023,7 +7045,7 @@
           </a:ln>
           <a:extLst>
             <a:ext uri="{C572A759-6A51-4108-AA02-DFA0A04FC94B}">
-              <ma14:wrappingTextBoxFlag xmlns:ma14="http://schemas.microsoft.com/office/mac/drawingml/2011/main" xmlns:a14="http://schemas.microsoft.com/office/drawing/2010/main" xmlns:m="http://schemas.openxmlformats.org/officeDocument/2006/math" xmlns="" val="1"/>
+              <ma14:wrappingTextBoxFlag xmlns="" xmlns:m="http://schemas.openxmlformats.org/officeDocument/2006/math" xmlns:a14="http://schemas.microsoft.com/office/drawing/2010/main" xmlns:ma14="http://schemas.microsoft.com/office/mac/drawingml/2011/main" val="1"/>
             </a:ext>
           </a:extLst>
         </p:spPr>
@@ -7080,7 +7102,7 @@
           </a:ln>
           <a:extLst>
             <a:ext uri="{C572A759-6A51-4108-AA02-DFA0A04FC94B}">
-              <ma14:wrappingTextBoxFlag xmlns:ma14="http://schemas.microsoft.com/office/mac/drawingml/2011/main" xmlns:a14="http://schemas.microsoft.com/office/drawing/2010/main" xmlns:m="http://schemas.openxmlformats.org/officeDocument/2006/math" xmlns="" val="1"/>
+              <ma14:wrappingTextBoxFlag xmlns="" xmlns:m="http://schemas.openxmlformats.org/officeDocument/2006/math" xmlns:a14="http://schemas.microsoft.com/office/drawing/2010/main" xmlns:ma14="http://schemas.microsoft.com/office/mac/drawingml/2011/main" val="1"/>
             </a:ext>
           </a:extLst>
         </p:spPr>
@@ -7440,7 +7462,7 @@
           </a:ln>
           <a:extLst>
             <a:ext uri="{C572A759-6A51-4108-AA02-DFA0A04FC94B}">
-              <ma14:wrappingTextBoxFlag xmlns="" xmlns:m="http://schemas.openxmlformats.org/officeDocument/2006/math" xmlns:a14="http://schemas.microsoft.com/office/drawing/2010/main" xmlns:ma14="http://schemas.microsoft.com/office/mac/drawingml/2011/main" val="1"/>
+              <ma14:wrappingTextBoxFlag xmlns:ma14="http://schemas.microsoft.com/office/mac/drawingml/2011/main" xmlns:a14="http://schemas.microsoft.com/office/drawing/2010/main" xmlns:m="http://schemas.openxmlformats.org/officeDocument/2006/math" xmlns="" val="1"/>
             </a:ext>
           </a:extLst>
         </p:spPr>
@@ -7497,7 +7519,7 @@
           </a:ln>
           <a:extLst>
             <a:ext uri="{C572A759-6A51-4108-AA02-DFA0A04FC94B}">
-              <ma14:wrappingTextBoxFlag xmlns="" xmlns:m="http://schemas.openxmlformats.org/officeDocument/2006/math" xmlns:a14="http://schemas.microsoft.com/office/drawing/2010/main" xmlns:ma14="http://schemas.microsoft.com/office/mac/drawingml/2011/main" val="1"/>
+              <ma14:wrappingTextBoxFlag xmlns:ma14="http://schemas.microsoft.com/office/mac/drawingml/2011/main" xmlns:a14="http://schemas.microsoft.com/office/drawing/2010/main" xmlns:m="http://schemas.openxmlformats.org/officeDocument/2006/math" xmlns="" val="1"/>
             </a:ext>
           </a:extLst>
         </p:spPr>
@@ -7763,7 +7785,7 @@
           </a:ln>
           <a:extLst>
             <a:ext uri="{C572A759-6A51-4108-AA02-DFA0A04FC94B}">
-              <ma14:wrappingTextBoxFlag xmlns="" xmlns:m="http://schemas.openxmlformats.org/officeDocument/2006/math" xmlns:a14="http://schemas.microsoft.com/office/drawing/2010/main" xmlns:ma14="http://schemas.microsoft.com/office/mac/drawingml/2011/main" val="1"/>
+              <ma14:wrappingTextBoxFlag xmlns:ma14="http://schemas.microsoft.com/office/mac/drawingml/2011/main" xmlns:a14="http://schemas.microsoft.com/office/drawing/2010/main" xmlns:m="http://schemas.openxmlformats.org/officeDocument/2006/math" xmlns="" val="1"/>
             </a:ext>
           </a:extLst>
         </p:spPr>
@@ -8056,7 +8078,7 @@
           </a:ln>
           <a:extLst>
             <a:ext uri="{C572A759-6A51-4108-AA02-DFA0A04FC94B}">
-              <ma14:wrappingTextBoxFlag xmlns:ma14="http://schemas.microsoft.com/office/mac/drawingml/2011/main" xmlns:a14="http://schemas.microsoft.com/office/drawing/2010/main" xmlns:m="http://schemas.openxmlformats.org/officeDocument/2006/math" xmlns="" val="1"/>
+              <ma14:wrappingTextBoxFlag xmlns="" xmlns:m="http://schemas.openxmlformats.org/officeDocument/2006/math" xmlns:a14="http://schemas.microsoft.com/office/drawing/2010/main" xmlns:ma14="http://schemas.microsoft.com/office/mac/drawingml/2011/main" val="1"/>
             </a:ext>
           </a:extLst>
         </p:spPr>
@@ -8113,7 +8135,7 @@
           </a:ln>
           <a:extLst>
             <a:ext uri="{C572A759-6A51-4108-AA02-DFA0A04FC94B}">
-              <ma14:wrappingTextBoxFlag xmlns:ma14="http://schemas.microsoft.com/office/mac/drawingml/2011/main" xmlns:a14="http://schemas.microsoft.com/office/drawing/2010/main" xmlns:m="http://schemas.openxmlformats.org/officeDocument/2006/math" xmlns="" val="1"/>
+              <ma14:wrappingTextBoxFlag xmlns="" xmlns:m="http://schemas.openxmlformats.org/officeDocument/2006/math" xmlns:a14="http://schemas.microsoft.com/office/drawing/2010/main" xmlns:ma14="http://schemas.microsoft.com/office/mac/drawingml/2011/main" val="1"/>
             </a:ext>
           </a:extLst>
         </p:spPr>
@@ -8205,7 +8227,7 @@
           </a:ln>
           <a:extLst>
             <a:ext uri="{C572A759-6A51-4108-AA02-DFA0A04FC94B}">
-              <ma14:wrappingTextBoxFlag xmlns:ma14="http://schemas.microsoft.com/office/mac/drawingml/2011/main" xmlns:a14="http://schemas.microsoft.com/office/drawing/2010/main" xmlns:m="http://schemas.openxmlformats.org/officeDocument/2006/math" xmlns="" val="1"/>
+              <ma14:wrappingTextBoxFlag xmlns="" xmlns:m="http://schemas.openxmlformats.org/officeDocument/2006/math" xmlns:a14="http://schemas.microsoft.com/office/drawing/2010/main" xmlns:ma14="http://schemas.microsoft.com/office/mac/drawingml/2011/main" val="1"/>
             </a:ext>
           </a:extLst>
         </p:spPr>
@@ -8604,7 +8626,7 @@
           </a:ln>
           <a:extLst>
             <a:ext uri="{C572A759-6A51-4108-AA02-DFA0A04FC94B}">
-              <ma14:wrappingTextBoxFlag xmlns="" xmlns:m="http://schemas.openxmlformats.org/officeDocument/2006/math" xmlns:a14="http://schemas.microsoft.com/office/drawing/2010/main" xmlns:ma14="http://schemas.microsoft.com/office/mac/drawingml/2011/main" val="1"/>
+              <ma14:wrappingTextBoxFlag xmlns:ma14="http://schemas.microsoft.com/office/mac/drawingml/2011/main" xmlns:a14="http://schemas.microsoft.com/office/drawing/2010/main" xmlns:m="http://schemas.openxmlformats.org/officeDocument/2006/math" xmlns="" val="1"/>
             </a:ext>
           </a:extLst>
         </p:spPr>
@@ -8661,7 +8683,7 @@
           </a:ln>
           <a:extLst>
             <a:ext uri="{C572A759-6A51-4108-AA02-DFA0A04FC94B}">
-              <ma14:wrappingTextBoxFlag xmlns="" xmlns:m="http://schemas.openxmlformats.org/officeDocument/2006/math" xmlns:a14="http://schemas.microsoft.com/office/drawing/2010/main" xmlns:ma14="http://schemas.microsoft.com/office/mac/drawingml/2011/main" val="1"/>
+              <ma14:wrappingTextBoxFlag xmlns:ma14="http://schemas.microsoft.com/office/mac/drawingml/2011/main" xmlns:a14="http://schemas.microsoft.com/office/drawing/2010/main" xmlns:m="http://schemas.openxmlformats.org/officeDocument/2006/math" xmlns="" val="1"/>
             </a:ext>
           </a:extLst>
         </p:spPr>
@@ -8849,7 +8871,7 @@
           </a:ln>
           <a:extLst>
             <a:ext uri="{C572A759-6A51-4108-AA02-DFA0A04FC94B}">
-              <ma14:wrappingTextBoxFlag xmlns="" xmlns:m="http://schemas.openxmlformats.org/officeDocument/2006/math" xmlns:a14="http://schemas.microsoft.com/office/drawing/2010/main" xmlns:ma14="http://schemas.microsoft.com/office/mac/drawingml/2011/main" val="1"/>
+              <ma14:wrappingTextBoxFlag xmlns:ma14="http://schemas.microsoft.com/office/mac/drawingml/2011/main" xmlns:a14="http://schemas.microsoft.com/office/drawing/2010/main" xmlns:m="http://schemas.openxmlformats.org/officeDocument/2006/math" xmlns="" val="1"/>
             </a:ext>
           </a:extLst>
         </p:spPr>
@@ -8906,7 +8928,7 @@
           </a:ln>
           <a:extLst>
             <a:ext uri="{C572A759-6A51-4108-AA02-DFA0A04FC94B}">
-              <ma14:wrappingTextBoxFlag xmlns="" xmlns:m="http://schemas.openxmlformats.org/officeDocument/2006/math" xmlns:a14="http://schemas.microsoft.com/office/drawing/2010/main" xmlns:ma14="http://schemas.microsoft.com/office/mac/drawingml/2011/main" val="1"/>
+              <ma14:wrappingTextBoxFlag xmlns:ma14="http://schemas.microsoft.com/office/mac/drawingml/2011/main" xmlns:a14="http://schemas.microsoft.com/office/drawing/2010/main" xmlns:m="http://schemas.openxmlformats.org/officeDocument/2006/math" xmlns="" val="1"/>
             </a:ext>
           </a:extLst>
         </p:spPr>
@@ -8998,7 +9020,7 @@
           </a:ln>
           <a:extLst>
             <a:ext uri="{C572A759-6A51-4108-AA02-DFA0A04FC94B}">
-              <ma14:wrappingTextBoxFlag xmlns="" xmlns:m="http://schemas.openxmlformats.org/officeDocument/2006/math" xmlns:a14="http://schemas.microsoft.com/office/drawing/2010/main" xmlns:ma14="http://schemas.microsoft.com/office/mac/drawingml/2011/main" val="1"/>
+              <ma14:wrappingTextBoxFlag xmlns:ma14="http://schemas.microsoft.com/office/mac/drawingml/2011/main" xmlns:a14="http://schemas.microsoft.com/office/drawing/2010/main" xmlns:m="http://schemas.openxmlformats.org/officeDocument/2006/math" xmlns="" val="1"/>
             </a:ext>
           </a:extLst>
         </p:spPr>
@@ -9271,7 +9293,7 @@
           </a:ln>
           <a:extLst>
             <a:ext uri="{C572A759-6A51-4108-AA02-DFA0A04FC94B}">
-              <ma14:wrappingTextBoxFlag xmlns="" xmlns:m="http://schemas.openxmlformats.org/officeDocument/2006/math" xmlns:a14="http://schemas.microsoft.com/office/drawing/2010/main" xmlns:ma14="http://schemas.microsoft.com/office/mac/drawingml/2011/main" val="1"/>
+              <ma14:wrappingTextBoxFlag xmlns:ma14="http://schemas.microsoft.com/office/mac/drawingml/2011/main" xmlns:a14="http://schemas.microsoft.com/office/drawing/2010/main" xmlns:m="http://schemas.openxmlformats.org/officeDocument/2006/math" xmlns="" val="1"/>
             </a:ext>
           </a:extLst>
         </p:spPr>
@@ -9328,7 +9350,7 @@
           </a:ln>
           <a:extLst>
             <a:ext uri="{C572A759-6A51-4108-AA02-DFA0A04FC94B}">
-              <ma14:wrappingTextBoxFlag xmlns="" xmlns:m="http://schemas.openxmlformats.org/officeDocument/2006/math" xmlns:a14="http://schemas.microsoft.com/office/drawing/2010/main" xmlns:ma14="http://schemas.microsoft.com/office/mac/drawingml/2011/main" val="1"/>
+              <ma14:wrappingTextBoxFlag xmlns:ma14="http://schemas.microsoft.com/office/mac/drawingml/2011/main" xmlns:a14="http://schemas.microsoft.com/office/drawing/2010/main" xmlns:m="http://schemas.openxmlformats.org/officeDocument/2006/math" xmlns="" val="1"/>
             </a:ext>
           </a:extLst>
         </p:spPr>
@@ -9556,7 +9578,7 @@
           </a:ln>
           <a:extLst>
             <a:ext uri="{C572A759-6A51-4108-AA02-DFA0A04FC94B}">
-              <ma14:wrappingTextBoxFlag xmlns="" xmlns:m="http://schemas.openxmlformats.org/officeDocument/2006/math" xmlns:a14="http://schemas.microsoft.com/office/drawing/2010/main" xmlns:ma14="http://schemas.microsoft.com/office/mac/drawingml/2011/main" val="1"/>
+              <ma14:wrappingTextBoxFlag xmlns:ma14="http://schemas.microsoft.com/office/mac/drawingml/2011/main" xmlns:a14="http://schemas.microsoft.com/office/drawing/2010/main" xmlns:m="http://schemas.openxmlformats.org/officeDocument/2006/math" xmlns="" val="1"/>
             </a:ext>
           </a:extLst>
         </p:spPr>
@@ -9613,7 +9635,7 @@
           </a:ln>
           <a:extLst>
             <a:ext uri="{C572A759-6A51-4108-AA02-DFA0A04FC94B}">
-              <ma14:wrappingTextBoxFlag xmlns="" xmlns:m="http://schemas.openxmlformats.org/officeDocument/2006/math" xmlns:a14="http://schemas.microsoft.com/office/drawing/2010/main" xmlns:ma14="http://schemas.microsoft.com/office/mac/drawingml/2011/main" val="1"/>
+              <ma14:wrappingTextBoxFlag xmlns:ma14="http://schemas.microsoft.com/office/mac/drawingml/2011/main" xmlns:a14="http://schemas.microsoft.com/office/drawing/2010/main" xmlns:m="http://schemas.openxmlformats.org/officeDocument/2006/math" xmlns="" val="1"/>
             </a:ext>
           </a:extLst>
         </p:spPr>
@@ -9705,7 +9727,7 @@
           </a:ln>
           <a:extLst>
             <a:ext uri="{C572A759-6A51-4108-AA02-DFA0A04FC94B}">
-              <ma14:wrappingTextBoxFlag xmlns="" xmlns:m="http://schemas.openxmlformats.org/officeDocument/2006/math" xmlns:a14="http://schemas.microsoft.com/office/drawing/2010/main" xmlns:ma14="http://schemas.microsoft.com/office/mac/drawingml/2011/main" val="1"/>
+              <ma14:wrappingTextBoxFlag xmlns:ma14="http://schemas.microsoft.com/office/mac/drawingml/2011/main" xmlns:a14="http://schemas.microsoft.com/office/drawing/2010/main" xmlns:m="http://schemas.openxmlformats.org/officeDocument/2006/math" xmlns="" val="1"/>
             </a:ext>
           </a:extLst>
         </p:spPr>
@@ -9957,7 +9979,7 @@
           </a:ln>
           <a:extLst>
             <a:ext uri="{C572A759-6A51-4108-AA02-DFA0A04FC94B}">
-              <ma14:wrappingTextBoxFlag xmlns="" xmlns:m="http://schemas.openxmlformats.org/officeDocument/2006/math" xmlns:a14="http://schemas.microsoft.com/office/drawing/2010/main" xmlns:ma14="http://schemas.microsoft.com/office/mac/drawingml/2011/main" val="1"/>
+              <ma14:wrappingTextBoxFlag xmlns:ma14="http://schemas.microsoft.com/office/mac/drawingml/2011/main" xmlns:a14="http://schemas.microsoft.com/office/drawing/2010/main" xmlns:m="http://schemas.openxmlformats.org/officeDocument/2006/math" xmlns="" val="1"/>
             </a:ext>
           </a:extLst>
         </p:spPr>
@@ -10014,7 +10036,7 @@
           </a:ln>
           <a:extLst>
             <a:ext uri="{C572A759-6A51-4108-AA02-DFA0A04FC94B}">
-              <ma14:wrappingTextBoxFlag xmlns="" xmlns:m="http://schemas.openxmlformats.org/officeDocument/2006/math" xmlns:a14="http://schemas.microsoft.com/office/drawing/2010/main" xmlns:ma14="http://schemas.microsoft.com/office/mac/drawingml/2011/main" val="1"/>
+              <ma14:wrappingTextBoxFlag xmlns:ma14="http://schemas.microsoft.com/office/mac/drawingml/2011/main" xmlns:a14="http://schemas.microsoft.com/office/drawing/2010/main" xmlns:m="http://schemas.openxmlformats.org/officeDocument/2006/math" xmlns="" val="1"/>
             </a:ext>
           </a:extLst>
         </p:spPr>
@@ -10106,7 +10128,7 @@
           </a:ln>
           <a:extLst>
             <a:ext uri="{C572A759-6A51-4108-AA02-DFA0A04FC94B}">
-              <ma14:wrappingTextBoxFlag xmlns="" xmlns:m="http://schemas.openxmlformats.org/officeDocument/2006/math" xmlns:a14="http://schemas.microsoft.com/office/drawing/2010/main" xmlns:ma14="http://schemas.microsoft.com/office/mac/drawingml/2011/main" val="1"/>
+              <ma14:wrappingTextBoxFlag xmlns:ma14="http://schemas.microsoft.com/office/mac/drawingml/2011/main" xmlns:a14="http://schemas.microsoft.com/office/drawing/2010/main" xmlns:m="http://schemas.openxmlformats.org/officeDocument/2006/math" xmlns="" val="1"/>
             </a:ext>
           </a:extLst>
         </p:spPr>
@@ -10590,7 +10612,7 @@
           </a:ln>
           <a:extLst>
             <a:ext uri="{C572A759-6A51-4108-AA02-DFA0A04FC94B}">
-              <ma14:wrappingTextBoxFlag xmlns="" xmlns:m="http://schemas.openxmlformats.org/officeDocument/2006/math" xmlns:a14="http://schemas.microsoft.com/office/drawing/2010/main" xmlns:ma14="http://schemas.microsoft.com/office/mac/drawingml/2011/main" val="1"/>
+              <ma14:wrappingTextBoxFlag xmlns:ma14="http://schemas.microsoft.com/office/mac/drawingml/2011/main" xmlns:a14="http://schemas.microsoft.com/office/drawing/2010/main" xmlns:m="http://schemas.openxmlformats.org/officeDocument/2006/math" xmlns="" val="1"/>
             </a:ext>
           </a:extLst>
         </p:spPr>
@@ -10647,7 +10669,7 @@
           </a:ln>
           <a:extLst>
             <a:ext uri="{C572A759-6A51-4108-AA02-DFA0A04FC94B}">
-              <ma14:wrappingTextBoxFlag xmlns="" xmlns:m="http://schemas.openxmlformats.org/officeDocument/2006/math" xmlns:a14="http://schemas.microsoft.com/office/drawing/2010/main" xmlns:ma14="http://schemas.microsoft.com/office/mac/drawingml/2011/main" val="1"/>
+              <ma14:wrappingTextBoxFlag xmlns:ma14="http://schemas.microsoft.com/office/mac/drawingml/2011/main" xmlns:a14="http://schemas.microsoft.com/office/drawing/2010/main" xmlns:m="http://schemas.openxmlformats.org/officeDocument/2006/math" xmlns="" val="1"/>
             </a:ext>
           </a:extLst>
         </p:spPr>
@@ -10739,7 +10761,7 @@
           </a:ln>
           <a:extLst>
             <a:ext uri="{C572A759-6A51-4108-AA02-DFA0A04FC94B}">
-              <ma14:wrappingTextBoxFlag xmlns="" xmlns:m="http://schemas.openxmlformats.org/officeDocument/2006/math" xmlns:a14="http://schemas.microsoft.com/office/drawing/2010/main" xmlns:ma14="http://schemas.microsoft.com/office/mac/drawingml/2011/main" val="1"/>
+              <ma14:wrappingTextBoxFlag xmlns:ma14="http://schemas.microsoft.com/office/mac/drawingml/2011/main" xmlns:a14="http://schemas.microsoft.com/office/drawing/2010/main" xmlns:m="http://schemas.openxmlformats.org/officeDocument/2006/math" xmlns="" val="1"/>
             </a:ext>
           </a:extLst>
         </p:spPr>
@@ -11068,7 +11090,7 @@
           </a:ln>
           <a:extLst>
             <a:ext uri="{C572A759-6A51-4108-AA02-DFA0A04FC94B}">
-              <ma14:wrappingTextBoxFlag xmlns="" xmlns:m="http://schemas.openxmlformats.org/officeDocument/2006/math" xmlns:a14="http://schemas.microsoft.com/office/drawing/2010/main" xmlns:ma14="http://schemas.microsoft.com/office/mac/drawingml/2011/main" val="1"/>
+              <ma14:wrappingTextBoxFlag xmlns:ma14="http://schemas.microsoft.com/office/mac/drawingml/2011/main" xmlns:a14="http://schemas.microsoft.com/office/drawing/2010/main" xmlns:m="http://schemas.openxmlformats.org/officeDocument/2006/math" xmlns="" val="1"/>
             </a:ext>
           </a:extLst>
         </p:spPr>
@@ -11125,7 +11147,7 @@
           </a:ln>
           <a:extLst>
             <a:ext uri="{C572A759-6A51-4108-AA02-DFA0A04FC94B}">
-              <ma14:wrappingTextBoxFlag xmlns="" xmlns:m="http://schemas.openxmlformats.org/officeDocument/2006/math" xmlns:a14="http://schemas.microsoft.com/office/drawing/2010/main" xmlns:ma14="http://schemas.microsoft.com/office/mac/drawingml/2011/main" val="1"/>
+              <ma14:wrappingTextBoxFlag xmlns:ma14="http://schemas.microsoft.com/office/mac/drawingml/2011/main" xmlns:a14="http://schemas.microsoft.com/office/drawing/2010/main" xmlns:m="http://schemas.openxmlformats.org/officeDocument/2006/math" xmlns="" val="1"/>
             </a:ext>
           </a:extLst>
         </p:spPr>
@@ -11217,7 +11239,7 @@
           </a:ln>
           <a:extLst>
             <a:ext uri="{C572A759-6A51-4108-AA02-DFA0A04FC94B}">
-              <ma14:wrappingTextBoxFlag xmlns="" xmlns:m="http://schemas.openxmlformats.org/officeDocument/2006/math" xmlns:a14="http://schemas.microsoft.com/office/drawing/2010/main" xmlns:ma14="http://schemas.microsoft.com/office/mac/drawingml/2011/main" val="1"/>
+              <ma14:wrappingTextBoxFlag xmlns:ma14="http://schemas.microsoft.com/office/mac/drawingml/2011/main" xmlns:a14="http://schemas.microsoft.com/office/drawing/2010/main" xmlns:m="http://schemas.openxmlformats.org/officeDocument/2006/math" xmlns="" val="1"/>
             </a:ext>
           </a:extLst>
         </p:spPr>
@@ -11478,7 +11500,7 @@
           </a:ln>
           <a:extLst>
             <a:ext uri="{C572A759-6A51-4108-AA02-DFA0A04FC94B}">
-              <ma14:wrappingTextBoxFlag xmlns="" xmlns:m="http://schemas.openxmlformats.org/officeDocument/2006/math" xmlns:a14="http://schemas.microsoft.com/office/drawing/2010/main" xmlns:ma14="http://schemas.microsoft.com/office/mac/drawingml/2011/main" val="1"/>
+              <ma14:wrappingTextBoxFlag xmlns:ma14="http://schemas.microsoft.com/office/mac/drawingml/2011/main" xmlns:a14="http://schemas.microsoft.com/office/drawing/2010/main" xmlns:m="http://schemas.openxmlformats.org/officeDocument/2006/math" xmlns="" val="1"/>
             </a:ext>
           </a:extLst>
         </p:spPr>
@@ -11593,7 +11615,7 @@
           </a:ln>
           <a:extLst>
             <a:ext uri="{C572A759-6A51-4108-AA02-DFA0A04FC94B}">
-              <ma14:wrappingTextBoxFlag xmlns="" xmlns:m="http://schemas.openxmlformats.org/officeDocument/2006/math" xmlns:a14="http://schemas.microsoft.com/office/drawing/2010/main" xmlns:ma14="http://schemas.microsoft.com/office/mac/drawingml/2011/main" val="1"/>
+              <ma14:wrappingTextBoxFlag xmlns:ma14="http://schemas.microsoft.com/office/mac/drawingml/2011/main" xmlns:a14="http://schemas.microsoft.com/office/drawing/2010/main" xmlns:m="http://schemas.openxmlformats.org/officeDocument/2006/math" xmlns="" val="1"/>
             </a:ext>
           </a:extLst>
         </p:spPr>
@@ -11649,7 +11671,7 @@
           </a:ln>
           <a:extLst>
             <a:ext uri="{C572A759-6A51-4108-AA02-DFA0A04FC94B}">
-              <ma14:wrappingTextBoxFlag xmlns="" xmlns:m="http://schemas.openxmlformats.org/officeDocument/2006/math" xmlns:a14="http://schemas.microsoft.com/office/drawing/2010/main" xmlns:ma14="http://schemas.microsoft.com/office/mac/drawingml/2011/main" val="1"/>
+              <ma14:wrappingTextBoxFlag xmlns:ma14="http://schemas.microsoft.com/office/mac/drawingml/2011/main" xmlns:a14="http://schemas.microsoft.com/office/drawing/2010/main" xmlns:m="http://schemas.openxmlformats.org/officeDocument/2006/math" xmlns="" val="1"/>
             </a:ext>
           </a:extLst>
         </p:spPr>
@@ -11795,7 +11817,7 @@
           </a:ln>
           <a:extLst>
             <a:ext uri="{C572A759-6A51-4108-AA02-DFA0A04FC94B}">
-              <ma14:wrappingTextBoxFlag xmlns="" xmlns:m="http://schemas.openxmlformats.org/officeDocument/2006/math" xmlns:a14="http://schemas.microsoft.com/office/drawing/2010/main" xmlns:ma14="http://schemas.microsoft.com/office/mac/drawingml/2011/main" val="1"/>
+              <ma14:wrappingTextBoxFlag xmlns:ma14="http://schemas.microsoft.com/office/mac/drawingml/2011/main" xmlns:a14="http://schemas.microsoft.com/office/drawing/2010/main" xmlns:m="http://schemas.openxmlformats.org/officeDocument/2006/math" xmlns="" val="1"/>
             </a:ext>
           </a:extLst>
         </p:spPr>
@@ -11852,7 +11874,7 @@
           </a:ln>
           <a:extLst>
             <a:ext uri="{C572A759-6A51-4108-AA02-DFA0A04FC94B}">
-              <ma14:wrappingTextBoxFlag xmlns="" xmlns:m="http://schemas.openxmlformats.org/officeDocument/2006/math" xmlns:a14="http://schemas.microsoft.com/office/drawing/2010/main" xmlns:ma14="http://schemas.microsoft.com/office/mac/drawingml/2011/main" val="1"/>
+              <ma14:wrappingTextBoxFlag xmlns:ma14="http://schemas.microsoft.com/office/mac/drawingml/2011/main" xmlns:a14="http://schemas.microsoft.com/office/drawing/2010/main" xmlns:m="http://schemas.openxmlformats.org/officeDocument/2006/math" xmlns="" val="1"/>
             </a:ext>
           </a:extLst>
         </p:spPr>
@@ -12019,7 +12041,7 @@
           </a:ln>
           <a:extLst>
             <a:ext uri="{C572A759-6A51-4108-AA02-DFA0A04FC94B}">
-              <ma14:wrappingTextBoxFlag xmlns="" xmlns:m="http://schemas.openxmlformats.org/officeDocument/2006/math" xmlns:a14="http://schemas.microsoft.com/office/drawing/2010/main" xmlns:ma14="http://schemas.microsoft.com/office/mac/drawingml/2011/main" val="1"/>
+              <ma14:wrappingTextBoxFlag xmlns:ma14="http://schemas.microsoft.com/office/mac/drawingml/2011/main" xmlns:a14="http://schemas.microsoft.com/office/drawing/2010/main" xmlns:m="http://schemas.openxmlformats.org/officeDocument/2006/math" xmlns="" val="1"/>
             </a:ext>
           </a:extLst>
         </p:spPr>
@@ -12197,7 +12219,7 @@
           </a:ln>
           <a:extLst>
             <a:ext uri="{C572A759-6A51-4108-AA02-DFA0A04FC94B}">
-              <ma14:wrappingTextBoxFlag xmlns="" xmlns:m="http://schemas.openxmlformats.org/officeDocument/2006/math" xmlns:a14="http://schemas.microsoft.com/office/drawing/2010/main" xmlns:ma14="http://schemas.microsoft.com/office/mac/drawingml/2011/main" val="1"/>
+              <ma14:wrappingTextBoxFlag xmlns:ma14="http://schemas.microsoft.com/office/mac/drawingml/2011/main" xmlns:a14="http://schemas.microsoft.com/office/drawing/2010/main" xmlns:m="http://schemas.openxmlformats.org/officeDocument/2006/math" xmlns="" val="1"/>
             </a:ext>
           </a:extLst>
         </p:spPr>
@@ -12255,7 +12277,7 @@
           </a:ln>
           <a:extLst>
             <a:ext uri="{C572A759-6A51-4108-AA02-DFA0A04FC94B}">
-              <ma14:wrappingTextBoxFlag xmlns="" xmlns:m="http://schemas.openxmlformats.org/officeDocument/2006/math" xmlns:ma14="http://schemas.microsoft.com/office/mac/drawingml/2011/main" xmlns:a14="http://schemas.microsoft.com/office/drawing/2010/main" xmlns:mc="http://schemas.openxmlformats.org/markup-compatibility/2006" val="1"/>
+              <ma14:wrappingTextBoxFlag xmlns:mc="http://schemas.openxmlformats.org/markup-compatibility/2006" xmlns:a14="http://schemas.microsoft.com/office/drawing/2010/main" xmlns:ma14="http://schemas.microsoft.com/office/mac/drawingml/2011/main" xmlns:m="http://schemas.openxmlformats.org/officeDocument/2006/math" xmlns="" val="1"/>
             </a:ext>
           </a:extLst>
         </p:spPr>
@@ -12420,7 +12442,7 @@
           </a:ln>
           <a:extLst>
             <a:ext uri="{C572A759-6A51-4108-AA02-DFA0A04FC94B}">
-              <ma14:wrappingTextBoxFlag xmlns="" xmlns:m="http://schemas.openxmlformats.org/officeDocument/2006/math" xmlns:a14="http://schemas.microsoft.com/office/drawing/2010/main" xmlns:ma14="http://schemas.microsoft.com/office/mac/drawingml/2011/main" val="1"/>
+              <ma14:wrappingTextBoxFlag xmlns:ma14="http://schemas.microsoft.com/office/mac/drawingml/2011/main" xmlns:a14="http://schemas.microsoft.com/office/drawing/2010/main" xmlns:m="http://schemas.openxmlformats.org/officeDocument/2006/math" xmlns="" val="1"/>
             </a:ext>
           </a:extLst>
         </p:spPr>
@@ -12593,7 +12615,7 @@
           </a:ln>
           <a:extLst>
             <a:ext uri="{C572A759-6A51-4108-AA02-DFA0A04FC94B}">
-              <ma14:wrappingTextBoxFlag xmlns="" xmlns:m="http://schemas.openxmlformats.org/officeDocument/2006/math" xmlns:a14="http://schemas.microsoft.com/office/drawing/2010/main" xmlns:ma14="http://schemas.microsoft.com/office/mac/drawingml/2011/main" val="1"/>
+              <ma14:wrappingTextBoxFlag xmlns:ma14="http://schemas.microsoft.com/office/mac/drawingml/2011/main" xmlns:a14="http://schemas.microsoft.com/office/drawing/2010/main" xmlns:m="http://schemas.openxmlformats.org/officeDocument/2006/math" xmlns="" val="1"/>
             </a:ext>
           </a:extLst>
         </p:spPr>
@@ -12651,7 +12673,7 @@
           </a:ln>
           <a:extLst>
             <a:ext uri="{C572A759-6A51-4108-AA02-DFA0A04FC94B}">
-              <ma14:wrappingTextBoxFlag xmlns="" xmlns:m="http://schemas.openxmlformats.org/officeDocument/2006/math" xmlns:a14="http://schemas.microsoft.com/office/drawing/2010/main" xmlns:ma14="http://schemas.microsoft.com/office/mac/drawingml/2011/main" val="1"/>
+              <ma14:wrappingTextBoxFlag xmlns:ma14="http://schemas.microsoft.com/office/mac/drawingml/2011/main" xmlns:a14="http://schemas.microsoft.com/office/drawing/2010/main" xmlns:m="http://schemas.openxmlformats.org/officeDocument/2006/math" xmlns="" val="1"/>
             </a:ext>
           </a:extLst>
         </p:spPr>
@@ -12832,8 +12854,8 @@
           </a:p>
         </p:txBody>
       </p:sp>
-      <mc:AlternateContent xmlns:mc="http://schemas.openxmlformats.org/markup-compatibility/2006">
-        <mc:Choice xmlns:a14="http://schemas.microsoft.com/office/drawing/2010/main" Requires="a14">
+      <mc:AlternateContent xmlns:mc="http://schemas.openxmlformats.org/markup-compatibility/2006" xmlns:a14="http://schemas.microsoft.com/office/drawing/2010/main">
+        <mc:Choice Requires="a14">
           <p:sp>
             <p:nvSpPr>
               <p:cNvPr id="2" name="Прямоугольник 1">
@@ -13453,7 +13475,7 @@
             </p:txBody>
           </p:sp>
         </mc:Choice>
-        <mc:Fallback>
+        <mc:Fallback xmlns="">
           <p:sp>
             <p:nvSpPr>
               <p:cNvPr id="2" name="Прямоугольник 1">
@@ -13580,7 +13602,7 @@
           </a:ln>
           <a:extLst>
             <a:ext uri="{C572A759-6A51-4108-AA02-DFA0A04FC94B}">
-              <ma14:wrappingTextBoxFlag xmlns="" xmlns:m="http://schemas.openxmlformats.org/officeDocument/2006/math" xmlns:a14="http://schemas.microsoft.com/office/drawing/2010/main" xmlns:ma14="http://schemas.microsoft.com/office/mac/drawingml/2011/main" val="1"/>
+              <ma14:wrappingTextBoxFlag xmlns:ma14="http://schemas.microsoft.com/office/mac/drawingml/2011/main" xmlns:a14="http://schemas.microsoft.com/office/drawing/2010/main" xmlns:m="http://schemas.openxmlformats.org/officeDocument/2006/math" xmlns="" val="1"/>
             </a:ext>
           </a:extLst>
         </p:spPr>
@@ -13638,7 +13660,7 @@
           </a:ln>
           <a:extLst>
             <a:ext uri="{C572A759-6A51-4108-AA02-DFA0A04FC94B}">
-              <ma14:wrappingTextBoxFlag xmlns="" xmlns:m="http://schemas.openxmlformats.org/officeDocument/2006/math" xmlns:a14="http://schemas.microsoft.com/office/drawing/2010/main" xmlns:ma14="http://schemas.microsoft.com/office/mac/drawingml/2011/main" val="1"/>
+              <ma14:wrappingTextBoxFlag xmlns:ma14="http://schemas.microsoft.com/office/mac/drawingml/2011/main" xmlns:a14="http://schemas.microsoft.com/office/drawing/2010/main" xmlns:m="http://schemas.openxmlformats.org/officeDocument/2006/math" xmlns="" val="1"/>
             </a:ext>
           </a:extLst>
         </p:spPr>
@@ -13947,7 +13969,7 @@
           </a:ln>
           <a:extLst>
             <a:ext uri="{C572A759-6A51-4108-AA02-DFA0A04FC94B}">
-              <ma14:wrappingTextBoxFlag xmlns="" xmlns:m="http://schemas.openxmlformats.org/officeDocument/2006/math" xmlns:a14="http://schemas.microsoft.com/office/drawing/2010/main" xmlns:ma14="http://schemas.microsoft.com/office/mac/drawingml/2011/main" val="1"/>
+              <ma14:wrappingTextBoxFlag xmlns:ma14="http://schemas.microsoft.com/office/mac/drawingml/2011/main" xmlns:a14="http://schemas.microsoft.com/office/drawing/2010/main" xmlns:m="http://schemas.openxmlformats.org/officeDocument/2006/math" xmlns="" val="1"/>
             </a:ext>
           </a:extLst>
         </p:spPr>
@@ -14125,7 +14147,7 @@
           </a:ln>
           <a:extLst>
             <a:ext uri="{C572A759-6A51-4108-AA02-DFA0A04FC94B}">
-              <ma14:wrappingTextBoxFlag xmlns="" xmlns:m="http://schemas.openxmlformats.org/officeDocument/2006/math" xmlns:a14="http://schemas.microsoft.com/office/drawing/2010/main" xmlns:ma14="http://schemas.microsoft.com/office/mac/drawingml/2011/main" val="1"/>
+              <ma14:wrappingTextBoxFlag xmlns:ma14="http://schemas.microsoft.com/office/mac/drawingml/2011/main" xmlns:a14="http://schemas.microsoft.com/office/drawing/2010/main" xmlns:m="http://schemas.openxmlformats.org/officeDocument/2006/math" xmlns="" val="1"/>
             </a:ext>
           </a:extLst>
         </p:spPr>
@@ -14183,7 +14205,7 @@
           </a:ln>
           <a:extLst>
             <a:ext uri="{C572A759-6A51-4108-AA02-DFA0A04FC94B}">
-              <ma14:wrappingTextBoxFlag xmlns="" xmlns:m="http://schemas.openxmlformats.org/officeDocument/2006/math" xmlns:a14="http://schemas.microsoft.com/office/drawing/2010/main" xmlns:ma14="http://schemas.microsoft.com/office/mac/drawingml/2011/main" val="1"/>
+              <ma14:wrappingTextBoxFlag xmlns:ma14="http://schemas.microsoft.com/office/mac/drawingml/2011/main" xmlns:a14="http://schemas.microsoft.com/office/drawing/2010/main" xmlns:m="http://schemas.openxmlformats.org/officeDocument/2006/math" xmlns="" val="1"/>
             </a:ext>
           </a:extLst>
         </p:spPr>
@@ -14556,7 +14578,7 @@
           </a:ln>
           <a:extLst>
             <a:ext uri="{C572A759-6A51-4108-AA02-DFA0A04FC94B}">
-              <ma14:wrappingTextBoxFlag xmlns="" xmlns:m="http://schemas.openxmlformats.org/officeDocument/2006/math" xmlns:a14="http://schemas.microsoft.com/office/drawing/2010/main" xmlns:ma14="http://schemas.microsoft.com/office/mac/drawingml/2011/main" val="1"/>
+              <ma14:wrappingTextBoxFlag xmlns:ma14="http://schemas.microsoft.com/office/mac/drawingml/2011/main" xmlns:a14="http://schemas.microsoft.com/office/drawing/2010/main" xmlns:m="http://schemas.openxmlformats.org/officeDocument/2006/math" xmlns="" val="1"/>
             </a:ext>
           </a:extLst>
         </p:spPr>
@@ -14614,7 +14636,7 @@
           </a:ln>
           <a:extLst>
             <a:ext uri="{C572A759-6A51-4108-AA02-DFA0A04FC94B}">
-              <ma14:wrappingTextBoxFlag xmlns="" xmlns:m="http://schemas.openxmlformats.org/officeDocument/2006/math" xmlns:a14="http://schemas.microsoft.com/office/drawing/2010/main" xmlns:ma14="http://schemas.microsoft.com/office/mac/drawingml/2011/main" val="1"/>
+              <ma14:wrappingTextBoxFlag xmlns:ma14="http://schemas.microsoft.com/office/mac/drawingml/2011/main" xmlns:a14="http://schemas.microsoft.com/office/drawing/2010/main" xmlns:m="http://schemas.openxmlformats.org/officeDocument/2006/math" xmlns="" val="1"/>
             </a:ext>
           </a:extLst>
         </p:spPr>
@@ -15022,7 +15044,7 @@
           </a:ln>
           <a:extLst>
             <a:ext uri="{C572A759-6A51-4108-AA02-DFA0A04FC94B}">
-              <ma14:wrappingTextBoxFlag xmlns="" xmlns:m="http://schemas.openxmlformats.org/officeDocument/2006/math" xmlns:a14="http://schemas.microsoft.com/office/drawing/2010/main" xmlns:ma14="http://schemas.microsoft.com/office/mac/drawingml/2011/main" val="1"/>
+              <ma14:wrappingTextBoxFlag xmlns:ma14="http://schemas.microsoft.com/office/mac/drawingml/2011/main" xmlns:a14="http://schemas.microsoft.com/office/drawing/2010/main" xmlns:m="http://schemas.openxmlformats.org/officeDocument/2006/math" xmlns="" val="1"/>
             </a:ext>
           </a:extLst>
         </p:spPr>
@@ -15200,7 +15222,7 @@
           </a:ln>
           <a:extLst>
             <a:ext uri="{C572A759-6A51-4108-AA02-DFA0A04FC94B}">
-              <ma14:wrappingTextBoxFlag xmlns="" xmlns:m="http://schemas.openxmlformats.org/officeDocument/2006/math" xmlns:a14="http://schemas.microsoft.com/office/drawing/2010/main" xmlns:ma14="http://schemas.microsoft.com/office/mac/drawingml/2011/main" val="1"/>
+              <ma14:wrappingTextBoxFlag xmlns:ma14="http://schemas.microsoft.com/office/mac/drawingml/2011/main" xmlns:a14="http://schemas.microsoft.com/office/drawing/2010/main" xmlns:m="http://schemas.openxmlformats.org/officeDocument/2006/math" xmlns="" val="1"/>
             </a:ext>
           </a:extLst>
         </p:spPr>
@@ -15258,7 +15280,7 @@
           </a:ln>
           <a:extLst>
             <a:ext uri="{C572A759-6A51-4108-AA02-DFA0A04FC94B}">
-              <ma14:wrappingTextBoxFlag xmlns="" xmlns:m="http://schemas.openxmlformats.org/officeDocument/2006/math" xmlns:a14="http://schemas.microsoft.com/office/drawing/2010/main" xmlns:ma14="http://schemas.microsoft.com/office/mac/drawingml/2011/main" val="1"/>
+              <ma14:wrappingTextBoxFlag xmlns:ma14="http://schemas.microsoft.com/office/mac/drawingml/2011/main" xmlns:a14="http://schemas.microsoft.com/office/drawing/2010/main" xmlns:m="http://schemas.openxmlformats.org/officeDocument/2006/math" xmlns="" val="1"/>
             </a:ext>
           </a:extLst>
         </p:spPr>

</xml_diff>